<commit_message>
changes during the course
</commit_message>
<xml_diff>
--- a/powerpoint files/Session1.pptx
+++ b/powerpoint files/Session1.pptx
@@ -143,7 +143,7 @@
   <pc:docChgLst>
     <pc:chgData name="Srinivasa Rao" userId="a6b54366-f13d-4292-8bb4-f06c50909b1e" providerId="ADAL" clId="{41D156DD-F322-3541-A394-B14DF1F17532}"/>
     <pc:docChg chg="modSld">
-      <pc:chgData name="Srinivasa Rao" userId="a6b54366-f13d-4292-8bb4-f06c50909b1e" providerId="ADAL" clId="{41D156DD-F322-3541-A394-B14DF1F17532}" dt="2023-10-30T17:18:03.722" v="9" actId="20577"/>
+      <pc:chgData name="Srinivasa Rao" userId="a6b54366-f13d-4292-8bb4-f06c50909b1e" providerId="ADAL" clId="{41D156DD-F322-3541-A394-B14DF1F17532}" dt="2023-10-31T10:14:58.346" v="38" actId="20577"/>
       <pc:docMkLst>
         <pc:docMk/>
       </pc:docMkLst>
@@ -159,6 +159,29 @@
             <pc:docMk/>
             <pc:sldMk cId="0" sldId="256"/>
             <ac:spMk id="191" creationId="{00000000-0000-0000-0000-000000000000}"/>
+          </ac:spMkLst>
+        </pc:spChg>
+      </pc:sldChg>
+      <pc:sldChg chg="modSp mod">
+        <pc:chgData name="Srinivasa Rao" userId="a6b54366-f13d-4292-8bb4-f06c50909b1e" providerId="ADAL" clId="{41D156DD-F322-3541-A394-B14DF1F17532}" dt="2023-10-31T10:14:58.346" v="38" actId="20577"/>
+        <pc:sldMkLst>
+          <pc:docMk/>
+          <pc:sldMk cId="0" sldId="267"/>
+        </pc:sldMkLst>
+        <pc:spChg chg="mod">
+          <ac:chgData name="Srinivasa Rao" userId="a6b54366-f13d-4292-8bb4-f06c50909b1e" providerId="ADAL" clId="{41D156DD-F322-3541-A394-B14DF1F17532}" dt="2023-10-31T09:21:33.716" v="11" actId="20577"/>
+          <ac:spMkLst>
+            <pc:docMk/>
+            <pc:sldMk cId="0" sldId="267"/>
+            <ac:spMk id="340" creationId="{00000000-0000-0000-0000-000000000000}"/>
+          </ac:spMkLst>
+        </pc:spChg>
+        <pc:spChg chg="mod">
+          <ac:chgData name="Srinivasa Rao" userId="a6b54366-f13d-4292-8bb4-f06c50909b1e" providerId="ADAL" clId="{41D156DD-F322-3541-A394-B14DF1F17532}" dt="2023-10-31T10:14:58.346" v="38" actId="20577"/>
+          <ac:spMkLst>
+            <pc:docMk/>
+            <pc:sldMk cId="0" sldId="267"/>
+            <ac:spMk id="344" creationId="{00000000-0000-0000-0000-000000000000}"/>
           </ac:spMkLst>
         </pc:spChg>
       </pc:sldChg>
@@ -10978,7 +11001,7 @@
         <p:spPr>
           <a:xfrm>
             <a:off x="901080" y="2398320"/>
-            <a:ext cx="8437320" cy="363960"/>
+            <a:ext cx="8437320" cy="367878"/>
           </a:xfrm>
           <a:prstGeom prst="rect">
             <a:avLst/>
@@ -11012,16 +11035,26 @@
               </a:lnSpc>
             </a:pPr>
             <a:r>
-              <a:rPr lang="en-GB" sz="1800" b="0" strike="noStrike" spc="-1">
+              <a:rPr lang="en-GB" spc="-1" dirty="0">
                 <a:solidFill>
                   <a:srgbClr val="000000"/>
                 </a:solidFill>
                 <a:latin typeface="Courier New"/>
                 <a:ea typeface="DejaVu Sans"/>
               </a:rPr>
-              <a:t>Df1[, “col1”] # base R syntax</a:t>
-            </a:r>
-            <a:endParaRPr lang="en-GB" sz="1800" b="0" strike="noStrike" spc="-1">
+              <a:t>d</a:t>
+            </a:r>
+            <a:r>
+              <a:rPr lang="en-GB" sz="1800" b="0" strike="noStrike" spc="-1" dirty="0">
+                <a:solidFill>
+                  <a:srgbClr val="000000"/>
+                </a:solidFill>
+                <a:latin typeface="Courier New"/>
+                <a:ea typeface="DejaVu Sans"/>
+              </a:rPr>
+              <a:t>f1[, “col1”] # base R syntax</a:t>
+            </a:r>
+            <a:endParaRPr lang="en-GB" sz="1800" b="0" strike="noStrike" spc="-1" dirty="0">
               <a:latin typeface="Arial"/>
             </a:endParaRPr>
           </a:p>
@@ -11286,7 +11319,7 @@
         <p:spPr>
           <a:xfrm>
             <a:off x="901080" y="5777640"/>
-            <a:ext cx="8437320" cy="363960"/>
+            <a:ext cx="8437320" cy="644877"/>
           </a:xfrm>
           <a:prstGeom prst="rect">
             <a:avLst/>
@@ -11320,7 +11353,7 @@
               </a:lnSpc>
             </a:pPr>
             <a:r>
-              <a:rPr lang="en-GB" sz="1800" b="0" strike="noStrike" spc="-1">
+              <a:rPr lang="en-GB" sz="1800" b="0" strike="noStrike" spc="-1" dirty="0">
                 <a:solidFill>
                   <a:srgbClr val="000000"/>
                 </a:solidFill>
@@ -11330,7 +11363,7 @@
               <a:t>df1 %&gt;% arrange(</a:t>
             </a:r>
             <a:r>
-              <a:rPr lang="en-GB" sz="1800" b="0" strike="noStrike" spc="-1">
+              <a:rPr lang="en-GB" sz="1800" b="0" strike="noStrike" spc="-1" dirty="0">
                 <a:solidFill>
                   <a:srgbClr val="D9D9D9"/>
                 </a:solidFill>
@@ -11340,7 +11373,7 @@
               <a:t>df1, </a:t>
             </a:r>
             <a:r>
-              <a:rPr lang="en-GB" sz="1800" b="0" strike="noStrike" spc="-1">
+              <a:rPr lang="en-GB" sz="1800" b="0" strike="noStrike" spc="-1" dirty="0">
                 <a:solidFill>
                   <a:srgbClr val="000000"/>
                 </a:solidFill>
@@ -11350,26 +11383,46 @@
               <a:t>col1) %&gt;% select(</a:t>
             </a:r>
             <a:r>
-              <a:rPr lang="en-GB" sz="1800" b="0" strike="noStrike" spc="-1">
+              <a:rPr lang="en-GB" sz="1800" b="0" strike="noStrike" spc="-1" dirty="0">
                 <a:solidFill>
                   <a:srgbClr val="D9D9D9"/>
                 </a:solidFill>
                 <a:latin typeface="Courier New"/>
                 <a:ea typeface="DejaVu Sans"/>
               </a:rPr>
-              <a:t>df1, </a:t>
-            </a:r>
-            <a:r>
-              <a:rPr lang="en-GB" sz="1800" b="0" strike="noStrike" spc="-1">
-                <a:solidFill>
-                  <a:srgbClr val="000000"/>
+              <a:t>&lt;</a:t>
+            </a:r>
+            <a:r>
+              <a:rPr lang="en-GB" sz="1800" b="0" strike="noStrike" spc="-1" dirty="0" err="1">
+                <a:solidFill>
+                  <a:srgbClr val="D9D9D9"/>
                 </a:solidFill>
                 <a:latin typeface="Courier New"/>
                 <a:ea typeface="DejaVu Sans"/>
               </a:rPr>
+              <a:t>output_from_previous_step</a:t>
+            </a:r>
+            <a:r>
+              <a:rPr lang="en-GB" sz="1800" b="0" strike="noStrike" spc="-1">
+                <a:solidFill>
+                  <a:srgbClr val="D9D9D9"/>
+                </a:solidFill>
+                <a:latin typeface="Courier New"/>
+                <a:ea typeface="DejaVu Sans"/>
+              </a:rPr>
+              <a:t>&gt;, </a:t>
+            </a:r>
+            <a:r>
+              <a:rPr lang="en-GB" sz="1800" b="0" strike="noStrike" spc="-1" dirty="0">
+                <a:solidFill>
+                  <a:srgbClr val="000000"/>
+                </a:solidFill>
+                <a:latin typeface="Courier New"/>
+                <a:ea typeface="DejaVu Sans"/>
+              </a:rPr>
               <a:t>col1, col3)</a:t>
             </a:r>
-            <a:endParaRPr lang="en-GB" sz="1800" b="0" strike="noStrike" spc="-1">
+            <a:endParaRPr lang="en-GB" sz="1800" b="0" strike="noStrike" spc="-1" dirty="0">
               <a:latin typeface="Arial"/>
             </a:endParaRPr>
           </a:p>
@@ -11443,6 +11496,13 @@
           </a:effectRef>
           <a:fontRef idx="minor"/>
         </p:style>
+        <p:txBody>
+          <a:bodyPr/>
+          <a:lstStyle/>
+          <a:p>
+            <a:endParaRPr lang="en-US"/>
+          </a:p>
+        </p:txBody>
       </p:sp>
       <p:sp>
         <p:nvSpPr>
@@ -11901,6 +11961,13 @@
           </a:effectRef>
           <a:fontRef idx="minor"/>
         </p:style>
+        <p:txBody>
+          <a:bodyPr/>
+          <a:lstStyle/>
+          <a:p>
+            <a:endParaRPr lang="en-US"/>
+          </a:p>
+        </p:txBody>
       </p:sp>
       <p:pic>
         <p:nvPicPr>
@@ -14015,6 +14082,13 @@
           </a:effectRef>
           <a:fontRef idx="minor"/>
         </p:style>
+        <p:txBody>
+          <a:bodyPr/>
+          <a:lstStyle/>
+          <a:p>
+            <a:endParaRPr lang="en-US"/>
+          </a:p>
+        </p:txBody>
       </p:sp>
       <p:sp>
         <p:nvSpPr>
@@ -14835,6 +14909,13 @@
           </a:effectRef>
           <a:fontRef idx="minor"/>
         </p:style>
+        <p:txBody>
+          <a:bodyPr/>
+          <a:lstStyle/>
+          <a:p>
+            <a:endParaRPr lang="en-US"/>
+          </a:p>
+        </p:txBody>
       </p:sp>
       <p:sp>
         <p:nvSpPr>
@@ -14867,6 +14948,13 @@
           </a:effectRef>
           <a:fontRef idx="minor"/>
         </p:style>
+        <p:txBody>
+          <a:bodyPr/>
+          <a:lstStyle/>
+          <a:p>
+            <a:endParaRPr lang="en-US"/>
+          </a:p>
+        </p:txBody>
       </p:sp>
       <p:sp>
         <p:nvSpPr>
@@ -14899,6 +14987,13 @@
           </a:effectRef>
           <a:fontRef idx="minor"/>
         </p:style>
+        <p:txBody>
+          <a:bodyPr/>
+          <a:lstStyle/>
+          <a:p>
+            <a:endParaRPr lang="en-US"/>
+          </a:p>
+        </p:txBody>
       </p:sp>
       <p:sp>
         <p:nvSpPr>
@@ -14931,6 +15026,13 @@
           </a:effectRef>
           <a:fontRef idx="minor"/>
         </p:style>
+        <p:txBody>
+          <a:bodyPr/>
+          <a:lstStyle/>
+          <a:p>
+            <a:endParaRPr lang="en-US"/>
+          </a:p>
+        </p:txBody>
       </p:sp>
       <p:sp>
         <p:nvSpPr>
@@ -15505,6 +15607,13 @@
           </a:effectRef>
           <a:fontRef idx="minor"/>
         </p:style>
+        <p:txBody>
+          <a:bodyPr/>
+          <a:lstStyle/>
+          <a:p>
+            <a:endParaRPr lang="en-US"/>
+          </a:p>
+        </p:txBody>
       </p:sp>
       <p:sp>
         <p:nvSpPr>
@@ -15963,6 +16072,13 @@
           </a:effectRef>
           <a:fontRef idx="minor"/>
         </p:style>
+        <p:txBody>
+          <a:bodyPr/>
+          <a:lstStyle/>
+          <a:p>
+            <a:endParaRPr lang="en-US"/>
+          </a:p>
+        </p:txBody>
       </p:sp>
       <p:pic>
         <p:nvPicPr>
@@ -16749,6 +16865,13 @@
           </a:effectRef>
           <a:fontRef idx="minor"/>
         </p:style>
+        <p:txBody>
+          <a:bodyPr/>
+          <a:lstStyle/>
+          <a:p>
+            <a:endParaRPr lang="en-US"/>
+          </a:p>
+        </p:txBody>
       </p:sp>
     </p:spTree>
   </p:cSld>

</xml_diff>